<commit_message>
New and Improved Course
</commit_message>
<xml_diff>
--- a/Modules/Module 3 - Introduction to Git and GitHub/Module 3 - Git and GitHub.pptx
+++ b/Modules/Module 3 - Introduction to Git and GitHub/Module 3 - Git and GitHub.pptx
@@ -127,7 +127,7 @@
 <file path=ppt/revisionInfo.xml><?xml version="1.0" encoding="utf-8"?>
 <p1510:revInfo xmlns:a="http://schemas.openxmlformats.org/drawingml/2006/main" xmlns:r="http://schemas.openxmlformats.org/officeDocument/2006/relationships" xmlns:p1510="http://schemas.microsoft.com/office/powerpoint/2015/10/main">
   <p1510:revLst>
-    <p1510:client id="{BA7FDC84-E589-44F7-AABF-0F56C0220751}" v="3290" dt="2018-06-21T17:37:57.590"/>
+    <p1510:client id="{F28005C0-9E95-4E85-B6CE-5479EA704FC7}" v="235" dt="2018-08-15T00:29:18.055"/>
   </p1510:revLst>
 </p1510:revInfo>
 </file>
@@ -242,6 +242,30 @@
       </pc:sldChg>
     </pc:docChg>
   </pc:docChgLst>
+  <pc:docChgLst>
+    <pc:chgData name="Jim Cheshire" userId="b85fe55d-f0de-4d09-bc19-562bc869f811" providerId="ADAL" clId="{F28005C0-9E95-4E85-B6CE-5479EA704FC7}"/>
+    <pc:docChg chg="custSel modSld">
+      <pc:chgData name="Jim Cheshire" userId="b85fe55d-f0de-4d09-bc19-562bc869f811" providerId="ADAL" clId="{F28005C0-9E95-4E85-B6CE-5479EA704FC7}" dt="2018-08-15T00:29:18.056" v="234" actId="404"/>
+      <pc:docMkLst>
+        <pc:docMk/>
+      </pc:docMkLst>
+      <pc:sldChg chg="modSp">
+        <pc:chgData name="Jim Cheshire" userId="b85fe55d-f0de-4d09-bc19-562bc869f811" providerId="ADAL" clId="{F28005C0-9E95-4E85-B6CE-5479EA704FC7}" dt="2018-08-15T00:29:18.056" v="234" actId="404"/>
+        <pc:sldMkLst>
+          <pc:docMk/>
+          <pc:sldMk cId="4237292162" sldId="264"/>
+        </pc:sldMkLst>
+        <pc:spChg chg="mod">
+          <ac:chgData name="Jim Cheshire" userId="b85fe55d-f0de-4d09-bc19-562bc869f811" providerId="ADAL" clId="{F28005C0-9E95-4E85-B6CE-5479EA704FC7}" dt="2018-08-15T00:29:18.056" v="234" actId="404"/>
+          <ac:spMkLst>
+            <pc:docMk/>
+            <pc:sldMk cId="4237292162" sldId="264"/>
+            <ac:spMk id="3" creationId="{C93804A5-D350-4745-A886-D3DBD12C730A}"/>
+          </ac:spMkLst>
+        </pc:spChg>
+      </pc:sldChg>
+    </pc:docChg>
+  </pc:docChgLst>
 </pc:chgInfo>
 </file>
 
@@ -327,7 +351,7 @@
           <a:p>
             <a:fld id="{DA5E4AB0-3C93-465A-80A9-3D5E1BA4126C}" type="datetimeFigureOut">
               <a:rPr lang="en-US" smtClean="0"/>
-              <a:t>6/21/2018</a:t>
+              <a:t>8/14/2018</a:t>
             </a:fld>
             <a:endParaRPr lang="en-US"/>
           </a:p>
@@ -1486,7 +1510,7 @@
           <a:noFill/>
           <a:extLst>
             <a:ext uri="{909E8E84-426E-40dd-AFC4-6F175D3DCCD1}">
-              <a14:hiddenFill xmlns="" xmlns:a14="http://schemas.microsoft.com/office/drawing/2010/main">
+              <a14:hiddenFill xmlns:a14="http://schemas.microsoft.com/office/drawing/2010/main" xmlns="">
                 <a:solidFill>
                   <a:srgbClr val="FFFFFF"/>
                 </a:solidFill>
@@ -1545,7 +1569,7 @@
             </a:ln>
             <a:extLst>
               <a:ext uri="{91240B29-F687-4f45-9708-019B960494DF}">
-                <a14:hiddenLine xmlns="" xmlns:a14="http://schemas.microsoft.com/office/drawing/2010/main" w="9525">
+                <a14:hiddenLine xmlns:a14="http://schemas.microsoft.com/office/drawing/2010/main" xmlns="" w="9525">
                   <a:solidFill>
                     <a:srgbClr val="000000"/>
                   </a:solidFill>
@@ -1635,7 +1659,7 @@
             </a:ln>
             <a:extLst>
               <a:ext uri="{91240B29-F687-4f45-9708-019B960494DF}">
-                <a14:hiddenLine xmlns="" xmlns:a14="http://schemas.microsoft.com/office/drawing/2010/main" w="9525">
+                <a14:hiddenLine xmlns:a14="http://schemas.microsoft.com/office/drawing/2010/main" xmlns="" w="9525">
                   <a:solidFill>
                     <a:srgbClr val="000000"/>
                   </a:solidFill>
@@ -1725,7 +1749,7 @@
             </a:ln>
             <a:extLst>
               <a:ext uri="{91240B29-F687-4f45-9708-019B960494DF}">
-                <a14:hiddenLine xmlns="" xmlns:a14="http://schemas.microsoft.com/office/drawing/2010/main" w="9525">
+                <a14:hiddenLine xmlns:a14="http://schemas.microsoft.com/office/drawing/2010/main" xmlns="" w="9525">
                   <a:solidFill>
                     <a:srgbClr val="000000"/>
                   </a:solidFill>
@@ -1759,7 +1783,7 @@
             </a:ln>
             <a:extLst>
               <a:ext uri="{91240B29-F687-4f45-9708-019B960494DF}">
-                <a14:hiddenLine xmlns="" xmlns:a14="http://schemas.microsoft.com/office/drawing/2010/main" w="9525">
+                <a14:hiddenLine xmlns:a14="http://schemas.microsoft.com/office/drawing/2010/main" xmlns="" w="9525">
                   <a:solidFill>
                     <a:srgbClr val="000000"/>
                   </a:solidFill>
@@ -1849,7 +1873,7 @@
             </a:ln>
             <a:extLst>
               <a:ext uri="{91240B29-F687-4f45-9708-019B960494DF}">
-                <a14:hiddenLine xmlns="" xmlns:a14="http://schemas.microsoft.com/office/drawing/2010/main" w="9525">
+                <a14:hiddenLine xmlns:a14="http://schemas.microsoft.com/office/drawing/2010/main" xmlns="" w="9525">
                   <a:solidFill>
                     <a:srgbClr val="000000"/>
                   </a:solidFill>
@@ -1911,7 +1935,7 @@
             </a:ln>
             <a:extLst>
               <a:ext uri="{91240B29-F687-4f45-9708-019B960494DF}">
-                <a14:hiddenLine xmlns="" xmlns:a14="http://schemas.microsoft.com/office/drawing/2010/main" w="9525">
+                <a14:hiddenLine xmlns:a14="http://schemas.microsoft.com/office/drawing/2010/main" xmlns="" w="9525">
                   <a:solidFill>
                     <a:srgbClr val="000000"/>
                   </a:solidFill>
@@ -1973,7 +1997,7 @@
             </a:ln>
             <a:extLst>
               <a:ext uri="{91240B29-F687-4f45-9708-019B960494DF}">
-                <a14:hiddenLine xmlns="" xmlns:a14="http://schemas.microsoft.com/office/drawing/2010/main" w="9525">
+                <a14:hiddenLine xmlns:a14="http://schemas.microsoft.com/office/drawing/2010/main" xmlns="" w="9525">
                   <a:solidFill>
                     <a:srgbClr val="000000"/>
                   </a:solidFill>
@@ -2063,7 +2087,7 @@
             </a:ln>
             <a:extLst>
               <a:ext uri="{91240B29-F687-4f45-9708-019B960494DF}">
-                <a14:hiddenLine xmlns="" xmlns:a14="http://schemas.microsoft.com/office/drawing/2010/main" w="9525">
+                <a14:hiddenLine xmlns:a14="http://schemas.microsoft.com/office/drawing/2010/main" xmlns="" w="9525">
                   <a:solidFill>
                     <a:srgbClr val="000000"/>
                   </a:solidFill>
@@ -2125,7 +2149,7 @@
             </a:ln>
             <a:extLst>
               <a:ext uri="{91240B29-F687-4f45-9708-019B960494DF}">
-                <a14:hiddenLine xmlns="" xmlns:a14="http://schemas.microsoft.com/office/drawing/2010/main" w="9525">
+                <a14:hiddenLine xmlns:a14="http://schemas.microsoft.com/office/drawing/2010/main" xmlns="" w="9525">
                   <a:solidFill>
                     <a:srgbClr val="000000"/>
                   </a:solidFill>
@@ -2187,7 +2211,7 @@
             </a:ln>
             <a:extLst>
               <a:ext uri="{91240B29-F687-4f45-9708-019B960494DF}">
-                <a14:hiddenLine xmlns="" xmlns:a14="http://schemas.microsoft.com/office/drawing/2010/main" w="9525">
+                <a14:hiddenLine xmlns:a14="http://schemas.microsoft.com/office/drawing/2010/main" xmlns="" w="9525">
                   <a:solidFill>
                     <a:srgbClr val="000000"/>
                   </a:solidFill>
@@ -2277,7 +2301,7 @@
             </a:ln>
             <a:extLst>
               <a:ext uri="{91240B29-F687-4f45-9708-019B960494DF}">
-                <a14:hiddenLine xmlns="" xmlns:a14="http://schemas.microsoft.com/office/drawing/2010/main" w="9525">
+                <a14:hiddenLine xmlns:a14="http://schemas.microsoft.com/office/drawing/2010/main" xmlns="" w="9525">
                   <a:solidFill>
                     <a:srgbClr val="000000"/>
                   </a:solidFill>
@@ -2367,7 +2391,7 @@
             </a:ln>
             <a:extLst>
               <a:ext uri="{91240B29-F687-4f45-9708-019B960494DF}">
-                <a14:hiddenLine xmlns="" xmlns:a14="http://schemas.microsoft.com/office/drawing/2010/main" w="9525">
+                <a14:hiddenLine xmlns:a14="http://schemas.microsoft.com/office/drawing/2010/main" xmlns="" w="9525">
                   <a:solidFill>
                     <a:srgbClr val="000000"/>
                   </a:solidFill>
@@ -2429,7 +2453,7 @@
             </a:ln>
             <a:extLst>
               <a:ext uri="{91240B29-F687-4f45-9708-019B960494DF}">
-                <a14:hiddenLine xmlns="" xmlns:a14="http://schemas.microsoft.com/office/drawing/2010/main" w="9525">
+                <a14:hiddenLine xmlns:a14="http://schemas.microsoft.com/office/drawing/2010/main" xmlns="" w="9525">
                   <a:solidFill>
                     <a:srgbClr val="000000"/>
                   </a:solidFill>
@@ -2539,7 +2563,7 @@
             </a:ln>
             <a:extLst>
               <a:ext uri="{91240B29-F687-4f45-9708-019B960494DF}">
-                <a14:hiddenLine xmlns="" xmlns:a14="http://schemas.microsoft.com/office/drawing/2010/main" w="9525">
+                <a14:hiddenLine xmlns:a14="http://schemas.microsoft.com/office/drawing/2010/main" xmlns="" w="9525">
                   <a:solidFill>
                     <a:srgbClr val="000000"/>
                   </a:solidFill>
@@ -2601,7 +2625,7 @@
             </a:ln>
             <a:extLst>
               <a:ext uri="{91240B29-F687-4f45-9708-019B960494DF}">
-                <a14:hiddenLine xmlns="" xmlns:a14="http://schemas.microsoft.com/office/drawing/2010/main" w="9525">
+                <a14:hiddenLine xmlns:a14="http://schemas.microsoft.com/office/drawing/2010/main" xmlns="" w="9525">
                   <a:solidFill>
                     <a:srgbClr val="000000"/>
                   </a:solidFill>
@@ -2691,7 +2715,7 @@
             </a:ln>
             <a:extLst>
               <a:ext uri="{91240B29-F687-4f45-9708-019B960494DF}">
-                <a14:hiddenLine xmlns="" xmlns:a14="http://schemas.microsoft.com/office/drawing/2010/main" w="9525">
+                <a14:hiddenLine xmlns:a14="http://schemas.microsoft.com/office/drawing/2010/main" xmlns="" w="9525">
                   <a:solidFill>
                     <a:srgbClr val="000000"/>
                   </a:solidFill>
@@ -2781,7 +2805,7 @@
             </a:ln>
             <a:extLst>
               <a:ext uri="{91240B29-F687-4f45-9708-019B960494DF}">
-                <a14:hiddenLine xmlns="" xmlns:a14="http://schemas.microsoft.com/office/drawing/2010/main" w="9525">
+                <a14:hiddenLine xmlns:a14="http://schemas.microsoft.com/office/drawing/2010/main" xmlns="" w="9525">
                   <a:solidFill>
                     <a:srgbClr val="000000"/>
                   </a:solidFill>
@@ -2843,7 +2867,7 @@
             </a:ln>
             <a:extLst>
               <a:ext uri="{91240B29-F687-4f45-9708-019B960494DF}">
-                <a14:hiddenLine xmlns="" xmlns:a14="http://schemas.microsoft.com/office/drawing/2010/main" w="9525">
+                <a14:hiddenLine xmlns:a14="http://schemas.microsoft.com/office/drawing/2010/main" xmlns="" w="9525">
                   <a:solidFill>
                     <a:srgbClr val="000000"/>
                   </a:solidFill>
@@ -2933,7 +2957,7 @@
             </a:ln>
             <a:extLst>
               <a:ext uri="{91240B29-F687-4f45-9708-019B960494DF}">
-                <a14:hiddenLine xmlns="" xmlns:a14="http://schemas.microsoft.com/office/drawing/2010/main" w="9525">
+                <a14:hiddenLine xmlns:a14="http://schemas.microsoft.com/office/drawing/2010/main" xmlns="" w="9525">
                   <a:solidFill>
                     <a:srgbClr val="000000"/>
                   </a:solidFill>
@@ -3023,7 +3047,7 @@
             </a:ln>
             <a:extLst>
               <a:ext uri="{91240B29-F687-4f45-9708-019B960494DF}">
-                <a14:hiddenLine xmlns="" xmlns:a14="http://schemas.microsoft.com/office/drawing/2010/main" w="9525">
+                <a14:hiddenLine xmlns:a14="http://schemas.microsoft.com/office/drawing/2010/main" xmlns="" w="9525">
                   <a:solidFill>
                     <a:srgbClr val="000000"/>
                   </a:solidFill>
@@ -3079,7 +3103,7 @@
             </a:ln>
             <a:extLst>
               <a:ext uri="{91240B29-F687-4f45-9708-019B960494DF}">
-                <a14:hiddenLine xmlns="" xmlns:a14="http://schemas.microsoft.com/office/drawing/2010/main" w="9525">
+                <a14:hiddenLine xmlns:a14="http://schemas.microsoft.com/office/drawing/2010/main" xmlns="" w="9525">
                   <a:solidFill>
                     <a:srgbClr val="000000"/>
                   </a:solidFill>
@@ -3169,7 +3193,7 @@
             </a:ln>
             <a:extLst>
               <a:ext uri="{91240B29-F687-4f45-9708-019B960494DF}">
-                <a14:hiddenLine xmlns="" xmlns:a14="http://schemas.microsoft.com/office/drawing/2010/main" w="9525">
+                <a14:hiddenLine xmlns:a14="http://schemas.microsoft.com/office/drawing/2010/main" xmlns="" w="9525">
                   <a:solidFill>
                     <a:srgbClr val="000000"/>
                   </a:solidFill>
@@ -3225,7 +3249,7 @@
             </a:ln>
             <a:extLst>
               <a:ext uri="{91240B29-F687-4f45-9708-019B960494DF}">
-                <a14:hiddenLine xmlns="" xmlns:a14="http://schemas.microsoft.com/office/drawing/2010/main" w="9525">
+                <a14:hiddenLine xmlns:a14="http://schemas.microsoft.com/office/drawing/2010/main" xmlns="" w="9525">
                   <a:solidFill>
                     <a:srgbClr val="000000"/>
                   </a:solidFill>
@@ -3315,7 +3339,7 @@
             </a:ln>
             <a:extLst>
               <a:ext uri="{91240B29-F687-4f45-9708-019B960494DF}">
-                <a14:hiddenLine xmlns="" xmlns:a14="http://schemas.microsoft.com/office/drawing/2010/main" w="9525">
+                <a14:hiddenLine xmlns:a14="http://schemas.microsoft.com/office/drawing/2010/main" xmlns="" w="9525">
                   <a:solidFill>
                     <a:srgbClr val="000000"/>
                   </a:solidFill>
@@ -3383,7 +3407,7 @@
             </a:ln>
             <a:extLst>
               <a:ext uri="{91240B29-F687-4f45-9708-019B960494DF}">
-                <a14:hiddenLine xmlns="" xmlns:a14="http://schemas.microsoft.com/office/drawing/2010/main" w="9525">
+                <a14:hiddenLine xmlns:a14="http://schemas.microsoft.com/office/drawing/2010/main" xmlns="" w="9525">
                   <a:solidFill>
                     <a:srgbClr val="000000"/>
                   </a:solidFill>
@@ -3473,7 +3497,7 @@
             </a:ln>
             <a:extLst>
               <a:ext uri="{91240B29-F687-4f45-9708-019B960494DF}">
-                <a14:hiddenLine xmlns="" xmlns:a14="http://schemas.microsoft.com/office/drawing/2010/main" w="9525">
+                <a14:hiddenLine xmlns:a14="http://schemas.microsoft.com/office/drawing/2010/main" xmlns="" w="9525">
                   <a:solidFill>
                     <a:srgbClr val="000000"/>
                   </a:solidFill>
@@ -3541,7 +3565,7 @@
             </a:ln>
             <a:extLst>
               <a:ext uri="{91240B29-F687-4f45-9708-019B960494DF}">
-                <a14:hiddenLine xmlns="" xmlns:a14="http://schemas.microsoft.com/office/drawing/2010/main" w="9525">
+                <a14:hiddenLine xmlns:a14="http://schemas.microsoft.com/office/drawing/2010/main" xmlns="" w="9525">
                   <a:solidFill>
                     <a:srgbClr val="000000"/>
                   </a:solidFill>
@@ -3631,7 +3655,7 @@
             </a:ln>
             <a:extLst>
               <a:ext uri="{91240B29-F687-4f45-9708-019B960494DF}">
-                <a14:hiddenLine xmlns="" xmlns:a14="http://schemas.microsoft.com/office/drawing/2010/main" w="9525">
+                <a14:hiddenLine xmlns:a14="http://schemas.microsoft.com/office/drawing/2010/main" xmlns="" w="9525">
                   <a:solidFill>
                     <a:srgbClr val="000000"/>
                   </a:solidFill>
@@ -3665,7 +3689,7 @@
             </a:ln>
             <a:extLst>
               <a:ext uri="{91240B29-F687-4f45-9708-019B960494DF}">
-                <a14:hiddenLine xmlns="" xmlns:a14="http://schemas.microsoft.com/office/drawing/2010/main" w="9525">
+                <a14:hiddenLine xmlns:a14="http://schemas.microsoft.com/office/drawing/2010/main" xmlns="" w="9525">
                   <a:solidFill>
                     <a:srgbClr val="000000"/>
                   </a:solidFill>
@@ -3755,7 +3779,7 @@
             </a:ln>
             <a:extLst>
               <a:ext uri="{91240B29-F687-4f45-9708-019B960494DF}">
-                <a14:hiddenLine xmlns="" xmlns:a14="http://schemas.microsoft.com/office/drawing/2010/main" w="9525">
+                <a14:hiddenLine xmlns:a14="http://schemas.microsoft.com/office/drawing/2010/main" xmlns="" w="9525">
                   <a:solidFill>
                     <a:srgbClr val="000000"/>
                   </a:solidFill>
@@ -3817,7 +3841,7 @@
             </a:ln>
             <a:extLst>
               <a:ext uri="{91240B29-F687-4f45-9708-019B960494DF}">
-                <a14:hiddenLine xmlns="" xmlns:a14="http://schemas.microsoft.com/office/drawing/2010/main" w="9525">
+                <a14:hiddenLine xmlns:a14="http://schemas.microsoft.com/office/drawing/2010/main" xmlns="" w="9525">
                   <a:solidFill>
                     <a:srgbClr val="000000"/>
                   </a:solidFill>
@@ -3879,7 +3903,7 @@
             </a:ln>
             <a:extLst>
               <a:ext uri="{91240B29-F687-4f45-9708-019B960494DF}">
-                <a14:hiddenLine xmlns="" xmlns:a14="http://schemas.microsoft.com/office/drawing/2010/main" w="9525">
+                <a14:hiddenLine xmlns:a14="http://schemas.microsoft.com/office/drawing/2010/main" xmlns="" w="9525">
                   <a:solidFill>
                     <a:srgbClr val="000000"/>
                   </a:solidFill>
@@ -3969,7 +3993,7 @@
             </a:ln>
             <a:extLst>
               <a:ext uri="{91240B29-F687-4f45-9708-019B960494DF}">
-                <a14:hiddenLine xmlns="" xmlns:a14="http://schemas.microsoft.com/office/drawing/2010/main" w="9525">
+                <a14:hiddenLine xmlns:a14="http://schemas.microsoft.com/office/drawing/2010/main" xmlns="" w="9525">
                   <a:solidFill>
                     <a:srgbClr val="000000"/>
                   </a:solidFill>
@@ -4037,7 +4061,7 @@
             </a:ln>
             <a:extLst>
               <a:ext uri="{91240B29-F687-4f45-9708-019B960494DF}">
-                <a14:hiddenLine xmlns="" xmlns:a14="http://schemas.microsoft.com/office/drawing/2010/main" w="9525">
+                <a14:hiddenLine xmlns:a14="http://schemas.microsoft.com/office/drawing/2010/main" xmlns="" w="9525">
                   <a:solidFill>
                     <a:srgbClr val="000000"/>
                   </a:solidFill>
@@ -4099,7 +4123,7 @@
             </a:ln>
             <a:extLst>
               <a:ext uri="{91240B29-F687-4f45-9708-019B960494DF}">
-                <a14:hiddenLine xmlns="" xmlns:a14="http://schemas.microsoft.com/office/drawing/2010/main" w="9525">
+                <a14:hiddenLine xmlns:a14="http://schemas.microsoft.com/office/drawing/2010/main" xmlns="" w="9525">
                   <a:solidFill>
                     <a:srgbClr val="000000"/>
                   </a:solidFill>
@@ -4189,7 +4213,7 @@
             </a:ln>
             <a:extLst>
               <a:ext uri="{91240B29-F687-4f45-9708-019B960494DF}">
-                <a14:hiddenLine xmlns="" xmlns:a14="http://schemas.microsoft.com/office/drawing/2010/main" w="9525">
+                <a14:hiddenLine xmlns:a14="http://schemas.microsoft.com/office/drawing/2010/main" xmlns="" w="9525">
                   <a:solidFill>
                     <a:srgbClr val="000000"/>
                   </a:solidFill>
@@ -4251,7 +4275,7 @@
             </a:ln>
             <a:extLst>
               <a:ext uri="{91240B29-F687-4f45-9708-019B960494DF}">
-                <a14:hiddenLine xmlns="" xmlns:a14="http://schemas.microsoft.com/office/drawing/2010/main" w="9525">
+                <a14:hiddenLine xmlns:a14="http://schemas.microsoft.com/office/drawing/2010/main" xmlns="" w="9525">
                   <a:solidFill>
                     <a:srgbClr val="000000"/>
                   </a:solidFill>
@@ -4341,7 +4365,7 @@
             </a:ln>
             <a:extLst>
               <a:ext uri="{91240B29-F687-4f45-9708-019B960494DF}">
-                <a14:hiddenLine xmlns="" xmlns:a14="http://schemas.microsoft.com/office/drawing/2010/main" w="9525">
+                <a14:hiddenLine xmlns:a14="http://schemas.microsoft.com/office/drawing/2010/main" xmlns="" w="9525">
                   <a:solidFill>
                     <a:srgbClr val="000000"/>
                   </a:solidFill>
@@ -4403,7 +4427,7 @@
             </a:ln>
             <a:extLst>
               <a:ext uri="{91240B29-F687-4f45-9708-019B960494DF}">
-                <a14:hiddenLine xmlns="" xmlns:a14="http://schemas.microsoft.com/office/drawing/2010/main" w="9525">
+                <a14:hiddenLine xmlns:a14="http://schemas.microsoft.com/office/drawing/2010/main" xmlns="" w="9525">
                   <a:solidFill>
                     <a:srgbClr val="000000"/>
                   </a:solidFill>
@@ -4493,7 +4517,7 @@
             </a:ln>
             <a:extLst>
               <a:ext uri="{91240B29-F687-4f45-9708-019B960494DF}">
-                <a14:hiddenLine xmlns="" xmlns:a14="http://schemas.microsoft.com/office/drawing/2010/main" w="9525">
+                <a14:hiddenLine xmlns:a14="http://schemas.microsoft.com/office/drawing/2010/main" xmlns="" w="9525">
                   <a:solidFill>
                     <a:srgbClr val="000000"/>
                   </a:solidFill>
@@ -4527,7 +4551,7 @@
             </a:ln>
             <a:extLst>
               <a:ext uri="{91240B29-F687-4f45-9708-019B960494DF}">
-                <a14:hiddenLine xmlns="" xmlns:a14="http://schemas.microsoft.com/office/drawing/2010/main" w="9525">
+                <a14:hiddenLine xmlns:a14="http://schemas.microsoft.com/office/drawing/2010/main" xmlns="" w="9525">
                   <a:solidFill>
                     <a:srgbClr val="000000"/>
                   </a:solidFill>
@@ -4592,7 +4616,7 @@
             </a:ln>
             <a:extLst>
               <a:ext uri="{91240B29-F687-4f45-9708-019B960494DF}">
-                <a14:hiddenLine xmlns="" xmlns:a14="http://schemas.microsoft.com/office/drawing/2010/main" w="9525">
+                <a14:hiddenLine xmlns:a14="http://schemas.microsoft.com/office/drawing/2010/main" xmlns="" w="9525">
                   <a:solidFill>
                     <a:srgbClr val="000000"/>
                   </a:solidFill>
@@ -4682,7 +4706,7 @@
             </a:ln>
             <a:extLst>
               <a:ext uri="{91240B29-F687-4f45-9708-019B960494DF}">
-                <a14:hiddenLine xmlns="" xmlns:a14="http://schemas.microsoft.com/office/drawing/2010/main" w="9525">
+                <a14:hiddenLine xmlns:a14="http://schemas.microsoft.com/office/drawing/2010/main" xmlns="" w="9525">
                   <a:solidFill>
                     <a:srgbClr val="000000"/>
                   </a:solidFill>
@@ -4744,7 +4768,7 @@
             </a:ln>
             <a:extLst>
               <a:ext uri="{91240B29-F687-4f45-9708-019B960494DF}">
-                <a14:hiddenLine xmlns="" xmlns:a14="http://schemas.microsoft.com/office/drawing/2010/main" w="9525">
+                <a14:hiddenLine xmlns:a14="http://schemas.microsoft.com/office/drawing/2010/main" xmlns="" w="9525">
                   <a:solidFill>
                     <a:srgbClr val="000000"/>
                   </a:solidFill>
@@ -4834,7 +4858,7 @@
             </a:ln>
             <a:extLst>
               <a:ext uri="{91240B29-F687-4f45-9708-019B960494DF}">
-                <a14:hiddenLine xmlns="" xmlns:a14="http://schemas.microsoft.com/office/drawing/2010/main" w="9525">
+                <a14:hiddenLine xmlns:a14="http://schemas.microsoft.com/office/drawing/2010/main" xmlns="" w="9525">
                   <a:solidFill>
                     <a:srgbClr val="000000"/>
                   </a:solidFill>
@@ -4924,7 +4948,7 @@
             </a:ln>
             <a:extLst>
               <a:ext uri="{91240B29-F687-4f45-9708-019B960494DF}">
-                <a14:hiddenLine xmlns="" xmlns:a14="http://schemas.microsoft.com/office/drawing/2010/main" w="9525">
+                <a14:hiddenLine xmlns:a14="http://schemas.microsoft.com/office/drawing/2010/main" xmlns="" w="9525">
                   <a:solidFill>
                     <a:srgbClr val="000000"/>
                   </a:solidFill>
@@ -4989,7 +5013,7 @@
             </a:ln>
             <a:extLst>
               <a:ext uri="{91240B29-F687-4f45-9708-019B960494DF}">
-                <a14:hiddenLine xmlns="" xmlns:a14="http://schemas.microsoft.com/office/drawing/2010/main" w="9525">
+                <a14:hiddenLine xmlns:a14="http://schemas.microsoft.com/office/drawing/2010/main" xmlns="" w="9525">
                   <a:solidFill>
                     <a:srgbClr val="000000"/>
                   </a:solidFill>
@@ -5051,7 +5075,7 @@
             </a:ln>
             <a:extLst>
               <a:ext uri="{91240B29-F687-4f45-9708-019B960494DF}">
-                <a14:hiddenLine xmlns="" xmlns:a14="http://schemas.microsoft.com/office/drawing/2010/main" w="9525">
+                <a14:hiddenLine xmlns:a14="http://schemas.microsoft.com/office/drawing/2010/main" xmlns="" w="9525">
                   <a:solidFill>
                     <a:srgbClr val="000000"/>
                   </a:solidFill>
@@ -5141,7 +5165,7 @@
             </a:ln>
             <a:extLst>
               <a:ext uri="{91240B29-F687-4f45-9708-019B960494DF}">
-                <a14:hiddenLine xmlns="" xmlns:a14="http://schemas.microsoft.com/office/drawing/2010/main" w="9525">
+                <a14:hiddenLine xmlns:a14="http://schemas.microsoft.com/office/drawing/2010/main" xmlns="" w="9525">
                   <a:solidFill>
                     <a:srgbClr val="000000"/>
                   </a:solidFill>
@@ -5231,7 +5255,7 @@
             </a:ln>
             <a:extLst>
               <a:ext uri="{91240B29-F687-4f45-9708-019B960494DF}">
-                <a14:hiddenLine xmlns="" xmlns:a14="http://schemas.microsoft.com/office/drawing/2010/main" w="9525">
+                <a14:hiddenLine xmlns:a14="http://schemas.microsoft.com/office/drawing/2010/main" xmlns="" w="9525">
                   <a:solidFill>
                     <a:srgbClr val="000000"/>
                   </a:solidFill>
@@ -5293,7 +5317,7 @@
             </a:ln>
             <a:extLst>
               <a:ext uri="{91240B29-F687-4f45-9708-019B960494DF}">
-                <a14:hiddenLine xmlns="" xmlns:a14="http://schemas.microsoft.com/office/drawing/2010/main" w="9525">
+                <a14:hiddenLine xmlns:a14="http://schemas.microsoft.com/office/drawing/2010/main" xmlns="" w="9525">
                   <a:solidFill>
                     <a:srgbClr val="000000"/>
                   </a:solidFill>
@@ -5413,7 +5437,7 @@
             </a:ln>
             <a:extLst>
               <a:ext uri="{91240B29-F687-4f45-9708-019B960494DF}">
-                <a14:hiddenLine xmlns="" xmlns:a14="http://schemas.microsoft.com/office/drawing/2010/main" w="9525">
+                <a14:hiddenLine xmlns:a14="http://schemas.microsoft.com/office/drawing/2010/main" xmlns="" w="9525">
                   <a:solidFill>
                     <a:srgbClr val="000000"/>
                   </a:solidFill>
@@ -5481,7 +5505,7 @@
             </a:ln>
             <a:extLst>
               <a:ext uri="{91240B29-F687-4f45-9708-019B960494DF}">
-                <a14:hiddenLine xmlns="" xmlns:a14="http://schemas.microsoft.com/office/drawing/2010/main" w="9525">
+                <a14:hiddenLine xmlns:a14="http://schemas.microsoft.com/office/drawing/2010/main" xmlns="" w="9525">
                   <a:solidFill>
                     <a:srgbClr val="000000"/>
                   </a:solidFill>
@@ -5571,7 +5595,7 @@
             </a:ln>
             <a:extLst>
               <a:ext uri="{91240B29-F687-4f45-9708-019B960494DF}">
-                <a14:hiddenLine xmlns="" xmlns:a14="http://schemas.microsoft.com/office/drawing/2010/main" w="9525">
+                <a14:hiddenLine xmlns:a14="http://schemas.microsoft.com/office/drawing/2010/main" xmlns="" w="9525">
                   <a:solidFill>
                     <a:srgbClr val="000000"/>
                   </a:solidFill>
@@ -5711,7 +5735,7 @@
           <a:p>
             <a:fld id="{48A87A34-81AB-432B-8DAE-1953F412C126}" type="datetimeFigureOut">
               <a:rPr lang="en-US" dirty="0"/>
-              <a:t>6/21/2018</a:t>
+              <a:t>8/14/2018</a:t>
             </a:fld>
             <a:endParaRPr lang="en-US" dirty="0"/>
           </a:p>
@@ -5973,7 +5997,7 @@
           <a:p>
             <a:fld id="{48A87A34-81AB-432B-8DAE-1953F412C126}" type="datetimeFigureOut">
               <a:rPr lang="en-US" dirty="0"/>
-              <a:t>6/21/2018</a:t>
+              <a:t>8/14/2018</a:t>
             </a:fld>
             <a:endParaRPr lang="en-US" dirty="0"/>
           </a:p>
@@ -6164,7 +6188,7 @@
           <a:p>
             <a:fld id="{48A87A34-81AB-432B-8DAE-1953F412C126}" type="datetimeFigureOut">
               <a:rPr lang="en-US" dirty="0"/>
-              <a:t>6/21/2018</a:t>
+              <a:t>8/14/2018</a:t>
             </a:fld>
             <a:endParaRPr lang="en-US" dirty="0"/>
           </a:p>
@@ -6422,7 +6446,7 @@
           <a:p>
             <a:fld id="{48A87A34-81AB-432B-8DAE-1953F412C126}" type="datetimeFigureOut">
               <a:rPr lang="en-US" dirty="0"/>
-              <a:t>6/21/2018</a:t>
+              <a:t>8/14/2018</a:t>
             </a:fld>
             <a:endParaRPr lang="en-US" dirty="0"/>
           </a:p>
@@ -6851,7 +6875,7 @@
           <a:p>
             <a:fld id="{48A87A34-81AB-432B-8DAE-1953F412C126}" type="datetimeFigureOut">
               <a:rPr lang="en-US" dirty="0"/>
-              <a:t>6/21/2018</a:t>
+              <a:t>8/14/2018</a:t>
             </a:fld>
             <a:endParaRPr lang="en-US" dirty="0"/>
           </a:p>
@@ -7392,7 +7416,7 @@
           <a:p>
             <a:fld id="{48A87A34-81AB-432B-8DAE-1953F412C126}" type="datetimeFigureOut">
               <a:rPr lang="en-US" dirty="0"/>
-              <a:t>6/21/2018</a:t>
+              <a:t>8/14/2018</a:t>
             </a:fld>
             <a:endParaRPr lang="en-US" dirty="0"/>
           </a:p>
@@ -8107,7 +8131,7 @@
           <a:p>
             <a:fld id="{48A87A34-81AB-432B-8DAE-1953F412C126}" type="datetimeFigureOut">
               <a:rPr lang="en-US" dirty="0"/>
-              <a:t>6/21/2018</a:t>
+              <a:t>8/14/2018</a:t>
             </a:fld>
             <a:endParaRPr lang="en-US" dirty="0"/>
           </a:p>
@@ -8272,7 +8296,7 @@
           <a:p>
             <a:fld id="{48A87A34-81AB-432B-8DAE-1953F412C126}" type="datetimeFigureOut">
               <a:rPr lang="en-US" dirty="0"/>
-              <a:t>6/21/2018</a:t>
+              <a:t>8/14/2018</a:t>
             </a:fld>
             <a:endParaRPr lang="en-US" dirty="0"/>
           </a:p>
@@ -8447,7 +8471,7 @@
           <a:p>
             <a:fld id="{48A87A34-81AB-432B-8DAE-1953F412C126}" type="datetimeFigureOut">
               <a:rPr lang="en-US" dirty="0"/>
-              <a:t>6/21/2018</a:t>
+              <a:t>8/14/2018</a:t>
             </a:fld>
             <a:endParaRPr lang="en-US" dirty="0"/>
           </a:p>
@@ -8612,7 +8636,7 @@
           <a:p>
             <a:fld id="{48A87A34-81AB-432B-8DAE-1953F412C126}" type="datetimeFigureOut">
               <a:rPr lang="en-US" dirty="0"/>
-              <a:t>6/21/2018</a:t>
+              <a:t>8/14/2018</a:t>
             </a:fld>
             <a:endParaRPr lang="en-US" dirty="0"/>
           </a:p>
@@ -8857,7 +8881,7 @@
           <a:p>
             <a:fld id="{48A87A34-81AB-432B-8DAE-1953F412C126}" type="datetimeFigureOut">
               <a:rPr lang="en-US" dirty="0"/>
-              <a:t>6/21/2018</a:t>
+              <a:t>8/14/2018</a:t>
             </a:fld>
             <a:endParaRPr lang="en-US" dirty="0"/>
           </a:p>
@@ -9084,7 +9108,7 @@
           <a:p>
             <a:fld id="{48A87A34-81AB-432B-8DAE-1953F412C126}" type="datetimeFigureOut">
               <a:rPr lang="en-US" dirty="0"/>
-              <a:t>6/21/2018</a:t>
+              <a:t>8/14/2018</a:t>
             </a:fld>
             <a:endParaRPr lang="en-US" dirty="0"/>
           </a:p>
@@ -9460,7 +9484,7 @@
           <a:p>
             <a:fld id="{48A87A34-81AB-432B-8DAE-1953F412C126}" type="datetimeFigureOut">
               <a:rPr lang="en-US" dirty="0"/>
-              <a:t>6/21/2018</a:t>
+              <a:t>8/14/2018</a:t>
             </a:fld>
             <a:endParaRPr lang="en-US" dirty="0"/>
           </a:p>
@@ -9573,7 +9597,7 @@
           <a:p>
             <a:fld id="{48A87A34-81AB-432B-8DAE-1953F412C126}" type="datetimeFigureOut">
               <a:rPr lang="en-US" dirty="0"/>
-              <a:t>6/21/2018</a:t>
+              <a:t>8/14/2018</a:t>
             </a:fld>
             <a:endParaRPr lang="en-US" dirty="0"/>
           </a:p>
@@ -9663,7 +9687,7 @@
           <a:p>
             <a:fld id="{48A87A34-81AB-432B-8DAE-1953F412C126}" type="datetimeFigureOut">
               <a:rPr lang="en-US" dirty="0"/>
-              <a:t>6/21/2018</a:t>
+              <a:t>8/14/2018</a:t>
             </a:fld>
             <a:endParaRPr lang="en-US" dirty="0"/>
           </a:p>
@@ -9907,7 +9931,7 @@
           <a:p>
             <a:fld id="{48A87A34-81AB-432B-8DAE-1953F412C126}" type="datetimeFigureOut">
               <a:rPr lang="en-US" dirty="0"/>
-              <a:t>6/21/2018</a:t>
+              <a:t>8/14/2018</a:t>
             </a:fld>
             <a:endParaRPr lang="en-US" dirty="0"/>
           </a:p>
@@ -10182,7 +10206,7 @@
           <a:p>
             <a:fld id="{48A87A34-81AB-432B-8DAE-1953F412C126}" type="datetimeFigureOut">
               <a:rPr lang="en-US" dirty="0"/>
-              <a:t>6/21/2018</a:t>
+              <a:t>8/14/2018</a:t>
             </a:fld>
             <a:endParaRPr lang="en-US" dirty="0"/>
           </a:p>
@@ -10300,7 +10324,7 @@
           <a:noFill/>
           <a:extLst>
             <a:ext uri="{909E8E84-426E-40dd-AFC4-6F175D3DCCD1}">
-              <a14:hiddenFill xmlns="" xmlns:a14="http://schemas.microsoft.com/office/drawing/2010/main">
+              <a14:hiddenFill xmlns:a14="http://schemas.microsoft.com/office/drawing/2010/main" xmlns="">
                 <a:solidFill>
                   <a:srgbClr val="FFFFFF"/>
                 </a:solidFill>
@@ -10374,7 +10398,7 @@
               </a:ln>
               <a:extLst>
                 <a:ext uri="{91240B29-F687-4f45-9708-019B960494DF}">
-                  <a14:hiddenLine xmlns="" xmlns:a14="http://schemas.microsoft.com/office/drawing/2010/main" w="9525">
+                  <a14:hiddenLine xmlns:a14="http://schemas.microsoft.com/office/drawing/2010/main" xmlns="" w="9525">
                     <a:solidFill>
                       <a:srgbClr val="000000"/>
                     </a:solidFill>
@@ -10464,7 +10488,7 @@
               </a:ln>
               <a:extLst>
                 <a:ext uri="{91240B29-F687-4f45-9708-019B960494DF}">
-                  <a14:hiddenLine xmlns="" xmlns:a14="http://schemas.microsoft.com/office/drawing/2010/main" w="9525">
+                  <a14:hiddenLine xmlns:a14="http://schemas.microsoft.com/office/drawing/2010/main" xmlns="" w="9525">
                     <a:solidFill>
                       <a:srgbClr val="000000"/>
                     </a:solidFill>
@@ -10554,7 +10578,7 @@
               </a:ln>
               <a:extLst>
                 <a:ext uri="{91240B29-F687-4f45-9708-019B960494DF}">
-                  <a14:hiddenLine xmlns="" xmlns:a14="http://schemas.microsoft.com/office/drawing/2010/main" w="9525">
+                  <a14:hiddenLine xmlns:a14="http://schemas.microsoft.com/office/drawing/2010/main" xmlns="" w="9525">
                     <a:solidFill>
                       <a:srgbClr val="000000"/>
                     </a:solidFill>
@@ -10616,7 +10640,7 @@
               </a:ln>
               <a:extLst>
                 <a:ext uri="{91240B29-F687-4f45-9708-019B960494DF}">
-                  <a14:hiddenLine xmlns="" xmlns:a14="http://schemas.microsoft.com/office/drawing/2010/main" w="9525">
+                  <a14:hiddenLine xmlns:a14="http://schemas.microsoft.com/office/drawing/2010/main" xmlns="" w="9525">
                     <a:solidFill>
                       <a:srgbClr val="000000"/>
                     </a:solidFill>
@@ -10706,7 +10730,7 @@
               </a:ln>
               <a:extLst>
                 <a:ext uri="{91240B29-F687-4f45-9708-019B960494DF}">
-                  <a14:hiddenLine xmlns="" xmlns:a14="http://schemas.microsoft.com/office/drawing/2010/main" w="9525">
+                  <a14:hiddenLine xmlns:a14="http://schemas.microsoft.com/office/drawing/2010/main" xmlns="" w="9525">
                     <a:solidFill>
                       <a:srgbClr val="000000"/>
                     </a:solidFill>
@@ -10768,7 +10792,7 @@
               </a:ln>
               <a:extLst>
                 <a:ext uri="{91240B29-F687-4f45-9708-019B960494DF}">
-                  <a14:hiddenLine xmlns="" xmlns:a14="http://schemas.microsoft.com/office/drawing/2010/main" w="9525">
+                  <a14:hiddenLine xmlns:a14="http://schemas.microsoft.com/office/drawing/2010/main" xmlns="" w="9525">
                     <a:solidFill>
                       <a:srgbClr val="000000"/>
                     </a:solidFill>
@@ -10830,7 +10854,7 @@
               </a:ln>
               <a:extLst>
                 <a:ext uri="{91240B29-F687-4f45-9708-019B960494DF}">
-                  <a14:hiddenLine xmlns="" xmlns:a14="http://schemas.microsoft.com/office/drawing/2010/main" w="9525">
+                  <a14:hiddenLine xmlns:a14="http://schemas.microsoft.com/office/drawing/2010/main" xmlns="" w="9525">
                     <a:solidFill>
                       <a:srgbClr val="000000"/>
                     </a:solidFill>
@@ -10920,7 +10944,7 @@
               </a:ln>
               <a:extLst>
                 <a:ext uri="{91240B29-F687-4f45-9708-019B960494DF}">
-                  <a14:hiddenLine xmlns="" xmlns:a14="http://schemas.microsoft.com/office/drawing/2010/main" w="9525">
+                  <a14:hiddenLine xmlns:a14="http://schemas.microsoft.com/office/drawing/2010/main" xmlns="" w="9525">
                     <a:solidFill>
                       <a:srgbClr val="000000"/>
                     </a:solidFill>
@@ -11010,7 +11034,7 @@
               </a:ln>
               <a:extLst>
                 <a:ext uri="{91240B29-F687-4f45-9708-019B960494DF}">
-                  <a14:hiddenLine xmlns="" xmlns:a14="http://schemas.microsoft.com/office/drawing/2010/main" w="9525">
+                  <a14:hiddenLine xmlns:a14="http://schemas.microsoft.com/office/drawing/2010/main" xmlns="" w="9525">
                     <a:solidFill>
                       <a:srgbClr val="000000"/>
                     </a:solidFill>
@@ -11072,7 +11096,7 @@
               </a:ln>
               <a:extLst>
                 <a:ext uri="{91240B29-F687-4f45-9708-019B960494DF}">
-                  <a14:hiddenLine xmlns="" xmlns:a14="http://schemas.microsoft.com/office/drawing/2010/main" w="9525">
+                  <a14:hiddenLine xmlns:a14="http://schemas.microsoft.com/office/drawing/2010/main" xmlns="" w="9525">
                     <a:solidFill>
                       <a:srgbClr val="000000"/>
                     </a:solidFill>
@@ -11182,7 +11206,7 @@
               </a:ln>
               <a:extLst>
                 <a:ext uri="{91240B29-F687-4f45-9708-019B960494DF}">
-                  <a14:hiddenLine xmlns="" xmlns:a14="http://schemas.microsoft.com/office/drawing/2010/main" w="9525">
+                  <a14:hiddenLine xmlns:a14="http://schemas.microsoft.com/office/drawing/2010/main" xmlns="" w="9525">
                     <a:solidFill>
                       <a:srgbClr val="000000"/>
                     </a:solidFill>
@@ -11266,7 +11290,7 @@
               </a:ln>
               <a:extLst>
                 <a:ext uri="{91240B29-F687-4f45-9708-019B960494DF}">
-                  <a14:hiddenLine xmlns="" xmlns:a14="http://schemas.microsoft.com/office/drawing/2010/main" w="9525">
+                  <a14:hiddenLine xmlns:a14="http://schemas.microsoft.com/office/drawing/2010/main" xmlns="" w="9525">
                     <a:solidFill>
                       <a:srgbClr val="000000"/>
                     </a:solidFill>
@@ -11328,7 +11352,7 @@
               </a:ln>
               <a:extLst>
                 <a:ext uri="{91240B29-F687-4f45-9708-019B960494DF}">
-                  <a14:hiddenLine xmlns="" xmlns:a14="http://schemas.microsoft.com/office/drawing/2010/main" w="9525">
+                  <a14:hiddenLine xmlns:a14="http://schemas.microsoft.com/office/drawing/2010/main" xmlns="" w="9525">
                     <a:solidFill>
                       <a:srgbClr val="000000"/>
                     </a:solidFill>
@@ -11390,7 +11414,7 @@
               </a:ln>
               <a:extLst>
                 <a:ext uri="{91240B29-F687-4f45-9708-019B960494DF}">
-                  <a14:hiddenLine xmlns="" xmlns:a14="http://schemas.microsoft.com/office/drawing/2010/main" w="9525">
+                  <a14:hiddenLine xmlns:a14="http://schemas.microsoft.com/office/drawing/2010/main" xmlns="" w="9525">
                     <a:solidFill>
                       <a:srgbClr val="000000"/>
                     </a:solidFill>
@@ -11480,7 +11504,7 @@
               </a:ln>
               <a:extLst>
                 <a:ext uri="{91240B29-F687-4f45-9708-019B960494DF}">
-                  <a14:hiddenLine xmlns="" xmlns:a14="http://schemas.microsoft.com/office/drawing/2010/main" w="9525">
+                  <a14:hiddenLine xmlns:a14="http://schemas.microsoft.com/office/drawing/2010/main" xmlns="" w="9525">
                     <a:solidFill>
                       <a:srgbClr val="000000"/>
                     </a:solidFill>
@@ -11514,7 +11538,7 @@
               </a:ln>
               <a:extLst>
                 <a:ext uri="{91240B29-F687-4f45-9708-019B960494DF}">
-                  <a14:hiddenLine xmlns="" xmlns:a14="http://schemas.microsoft.com/office/drawing/2010/main" w="9525">
+                  <a14:hiddenLine xmlns:a14="http://schemas.microsoft.com/office/drawing/2010/main" xmlns="" w="9525">
                     <a:solidFill>
                       <a:srgbClr val="000000"/>
                     </a:solidFill>
@@ -11579,7 +11603,7 @@
               </a:ln>
               <a:extLst>
                 <a:ext uri="{91240B29-F687-4f45-9708-019B960494DF}">
-                  <a14:hiddenLine xmlns="" xmlns:a14="http://schemas.microsoft.com/office/drawing/2010/main" w="9525">
+                  <a14:hiddenLine xmlns:a14="http://schemas.microsoft.com/office/drawing/2010/main" xmlns="" w="9525">
                     <a:solidFill>
                       <a:srgbClr val="000000"/>
                     </a:solidFill>
@@ -11669,7 +11693,7 @@
               </a:ln>
               <a:extLst>
                 <a:ext uri="{91240B29-F687-4f45-9708-019B960494DF}">
-                  <a14:hiddenLine xmlns="" xmlns:a14="http://schemas.microsoft.com/office/drawing/2010/main" w="9525">
+                  <a14:hiddenLine xmlns:a14="http://schemas.microsoft.com/office/drawing/2010/main" xmlns="" w="9525">
                     <a:solidFill>
                       <a:srgbClr val="000000"/>
                     </a:solidFill>
@@ -11731,7 +11755,7 @@
               </a:ln>
               <a:extLst>
                 <a:ext uri="{91240B29-F687-4f45-9708-019B960494DF}">
-                  <a14:hiddenLine xmlns="" xmlns:a14="http://schemas.microsoft.com/office/drawing/2010/main" w="9525">
+                  <a14:hiddenLine xmlns:a14="http://schemas.microsoft.com/office/drawing/2010/main" xmlns="" w="9525">
                     <a:solidFill>
                       <a:srgbClr val="000000"/>
                     </a:solidFill>
@@ -11821,7 +11845,7 @@
               </a:ln>
               <a:extLst>
                 <a:ext uri="{91240B29-F687-4f45-9708-019B960494DF}">
-                  <a14:hiddenLine xmlns="" xmlns:a14="http://schemas.microsoft.com/office/drawing/2010/main" w="9525">
+                  <a14:hiddenLine xmlns:a14="http://schemas.microsoft.com/office/drawing/2010/main" xmlns="" w="9525">
                     <a:solidFill>
                       <a:srgbClr val="000000"/>
                     </a:solidFill>
@@ -11886,7 +11910,7 @@
               </a:ln>
               <a:extLst>
                 <a:ext uri="{91240B29-F687-4f45-9708-019B960494DF}">
-                  <a14:hiddenLine xmlns="" xmlns:a14="http://schemas.microsoft.com/office/drawing/2010/main" w="9525">
+                  <a14:hiddenLine xmlns:a14="http://schemas.microsoft.com/office/drawing/2010/main" xmlns="" w="9525">
                     <a:solidFill>
                       <a:srgbClr val="000000"/>
                     </a:solidFill>
@@ -11948,7 +11972,7 @@
               </a:ln>
               <a:extLst>
                 <a:ext uri="{91240B29-F687-4f45-9708-019B960494DF}">
-                  <a14:hiddenLine xmlns="" xmlns:a14="http://schemas.microsoft.com/office/drawing/2010/main" w="9525">
+                  <a14:hiddenLine xmlns:a14="http://schemas.microsoft.com/office/drawing/2010/main" xmlns="" w="9525">
                     <a:solidFill>
                       <a:srgbClr val="000000"/>
                     </a:solidFill>
@@ -12038,7 +12062,7 @@
               </a:ln>
               <a:extLst>
                 <a:ext uri="{91240B29-F687-4f45-9708-019B960494DF}">
-                  <a14:hiddenLine xmlns="" xmlns:a14="http://schemas.microsoft.com/office/drawing/2010/main" w="9525">
+                  <a14:hiddenLine xmlns:a14="http://schemas.microsoft.com/office/drawing/2010/main" xmlns="" w="9525">
                     <a:solidFill>
                       <a:srgbClr val="000000"/>
                     </a:solidFill>
@@ -12128,7 +12152,7 @@
               </a:ln>
               <a:extLst>
                 <a:ext uri="{91240B29-F687-4f45-9708-019B960494DF}">
-                  <a14:hiddenLine xmlns="" xmlns:a14="http://schemas.microsoft.com/office/drawing/2010/main" w="9525">
+                  <a14:hiddenLine xmlns:a14="http://schemas.microsoft.com/office/drawing/2010/main" xmlns="" w="9525">
                     <a:solidFill>
                       <a:srgbClr val="000000"/>
                     </a:solidFill>
@@ -12193,7 +12217,7 @@
               </a:ln>
               <a:extLst>
                 <a:ext uri="{91240B29-F687-4f45-9708-019B960494DF}">
-                  <a14:hiddenLine xmlns="" xmlns:a14="http://schemas.microsoft.com/office/drawing/2010/main" w="9525">
+                  <a14:hiddenLine xmlns:a14="http://schemas.microsoft.com/office/drawing/2010/main" xmlns="" w="9525">
                     <a:solidFill>
                       <a:srgbClr val="000000"/>
                     </a:solidFill>
@@ -12313,7 +12337,7 @@
               </a:ln>
               <a:extLst>
                 <a:ext uri="{91240B29-F687-4f45-9708-019B960494DF}">
-                  <a14:hiddenLine xmlns="" xmlns:a14="http://schemas.microsoft.com/office/drawing/2010/main" w="9525">
+                  <a14:hiddenLine xmlns:a14="http://schemas.microsoft.com/office/drawing/2010/main" xmlns="" w="9525">
                     <a:solidFill>
                       <a:srgbClr val="000000"/>
                     </a:solidFill>
@@ -12394,7 +12418,7 @@
               </a:ln>
               <a:extLst>
                 <a:ext uri="{91240B29-F687-4f45-9708-019B960494DF}">
-                  <a14:hiddenLine xmlns="" xmlns:a14="http://schemas.microsoft.com/office/drawing/2010/main" w="9525">
+                  <a14:hiddenLine xmlns:a14="http://schemas.microsoft.com/office/drawing/2010/main" xmlns="" w="9525">
                     <a:solidFill>
                       <a:srgbClr val="000000"/>
                     </a:solidFill>
@@ -12509,7 +12533,7 @@
               </a:ln>
               <a:extLst>
                 <a:ext uri="{91240B29-F687-4f45-9708-019B960494DF}">
-                  <a14:hiddenLine xmlns="" xmlns:a14="http://schemas.microsoft.com/office/drawing/2010/main" w="9525">
+                  <a14:hiddenLine xmlns:a14="http://schemas.microsoft.com/office/drawing/2010/main" xmlns="" w="9525">
                     <a:solidFill>
                       <a:srgbClr val="000000"/>
                     </a:solidFill>
@@ -12599,7 +12623,7 @@
               </a:ln>
               <a:extLst>
                 <a:ext uri="{91240B29-F687-4f45-9708-019B960494DF}">
-                  <a14:hiddenLine xmlns="" xmlns:a14="http://schemas.microsoft.com/office/drawing/2010/main" w="9525">
+                  <a14:hiddenLine xmlns:a14="http://schemas.microsoft.com/office/drawing/2010/main" xmlns="" w="9525">
                     <a:solidFill>
                       <a:srgbClr val="000000"/>
                     </a:solidFill>
@@ -12664,7 +12688,7 @@
               </a:ln>
               <a:extLst>
                 <a:ext uri="{91240B29-F687-4f45-9708-019B960494DF}">
-                  <a14:hiddenLine xmlns="" xmlns:a14="http://schemas.microsoft.com/office/drawing/2010/main" w="9525">
+                  <a14:hiddenLine xmlns:a14="http://schemas.microsoft.com/office/drawing/2010/main" xmlns="" w="9525">
                     <a:solidFill>
                       <a:srgbClr val="000000"/>
                     </a:solidFill>
@@ -12754,7 +12778,7 @@
               </a:ln>
               <a:extLst>
                 <a:ext uri="{91240B29-F687-4f45-9708-019B960494DF}">
-                  <a14:hiddenLine xmlns="" xmlns:a14="http://schemas.microsoft.com/office/drawing/2010/main" w="9525">
+                  <a14:hiddenLine xmlns:a14="http://schemas.microsoft.com/office/drawing/2010/main" xmlns="" w="9525">
                     <a:solidFill>
                       <a:srgbClr val="000000"/>
                     </a:solidFill>
@@ -12822,7 +12846,7 @@
               </a:ln>
               <a:extLst>
                 <a:ext uri="{91240B29-F687-4f45-9708-019B960494DF}">
-                  <a14:hiddenLine xmlns="" xmlns:a14="http://schemas.microsoft.com/office/drawing/2010/main" w="9525">
+                  <a14:hiddenLine xmlns:a14="http://schemas.microsoft.com/office/drawing/2010/main" xmlns="" w="9525">
                     <a:solidFill>
                       <a:srgbClr val="000000"/>
                     </a:solidFill>
@@ -12912,7 +12936,7 @@
               </a:ln>
               <a:extLst>
                 <a:ext uri="{91240B29-F687-4f45-9708-019B960494DF}">
-                  <a14:hiddenLine xmlns="" xmlns:a14="http://schemas.microsoft.com/office/drawing/2010/main" w="9525">
+                  <a14:hiddenLine xmlns:a14="http://schemas.microsoft.com/office/drawing/2010/main" xmlns="" w="9525">
                     <a:solidFill>
                       <a:srgbClr val="000000"/>
                     </a:solidFill>
@@ -12980,7 +13004,7 @@
               </a:ln>
               <a:extLst>
                 <a:ext uri="{91240B29-F687-4f45-9708-019B960494DF}">
-                  <a14:hiddenLine xmlns="" xmlns:a14="http://schemas.microsoft.com/office/drawing/2010/main" w="9525">
+                  <a14:hiddenLine xmlns:a14="http://schemas.microsoft.com/office/drawing/2010/main" xmlns="" w="9525">
                     <a:solidFill>
                       <a:srgbClr val="000000"/>
                     </a:solidFill>
@@ -13070,7 +13094,7 @@
               </a:ln>
               <a:extLst>
                 <a:ext uri="{91240B29-F687-4f45-9708-019B960494DF}">
-                  <a14:hiddenLine xmlns="" xmlns:a14="http://schemas.microsoft.com/office/drawing/2010/main" w="9525">
+                  <a14:hiddenLine xmlns:a14="http://schemas.microsoft.com/office/drawing/2010/main" xmlns="" w="9525">
                     <a:solidFill>
                       <a:srgbClr val="000000"/>
                     </a:solidFill>
@@ -13104,7 +13128,7 @@
               </a:ln>
               <a:extLst>
                 <a:ext uri="{91240B29-F687-4f45-9708-019B960494DF}">
-                  <a14:hiddenLine xmlns="" xmlns:a14="http://schemas.microsoft.com/office/drawing/2010/main" w="9525">
+                  <a14:hiddenLine xmlns:a14="http://schemas.microsoft.com/office/drawing/2010/main" xmlns="" w="9525">
                     <a:solidFill>
                       <a:srgbClr val="000000"/>
                     </a:solidFill>
@@ -13245,7 +13269,7 @@
             <a:fld id="{48A87A34-81AB-432B-8DAE-1953F412C126}" type="datetimeFigureOut">
               <a:rPr lang="en-US" dirty="0"/>
               <a:pPr/>
-              <a:t>6/21/2018</a:t>
+              <a:t>8/14/2018</a:t>
             </a:fld>
             <a:endParaRPr lang="en-US" dirty="0"/>
           </a:p>
@@ -15103,7 +15127,9 @@
         </p:nvSpPr>
         <p:spPr/>
         <p:txBody>
-          <a:bodyPr/>
+          <a:bodyPr>
+            <a:normAutofit/>
+          </a:bodyPr>
           <a:lstStyle/>
           <a:p>
             <a:pPr marL="0" indent="0">
@@ -15131,6 +15157,74 @@
               <a:rPr lang="en-US" dirty="0"/>
               <a:t> is a remote pointing to the URL of the repository.</a:t>
             </a:r>
+          </a:p>
+          <a:p>
+            <a:pPr lvl="1"/>
+            <a:r>
+              <a:rPr lang="en-US" dirty="0"/>
+              <a:t>You can use </a:t>
+            </a:r>
+            <a:r>
+              <a:rPr lang="en-US" sz="1800" dirty="0">
+                <a:latin typeface="Consolas" panose="020B0609020204030204" pitchFamily="49" charset="0"/>
+              </a:rPr>
+              <a:t>git remote show origin </a:t>
+            </a:r>
+            <a:r>
+              <a:rPr lang="en-US" dirty="0"/>
+              <a:t>to see details on that. (Or </a:t>
+            </a:r>
+            <a:r>
+              <a:rPr lang="en-US" sz="1800" dirty="0">
+                <a:latin typeface="Consolas" panose="020B0609020204030204" pitchFamily="49" charset="0"/>
+              </a:rPr>
+              <a:t>git remote –v</a:t>
+            </a:r>
+            <a:r>
+              <a:rPr lang="en-US" dirty="0"/>
+              <a:t>.)</a:t>
+            </a:r>
+          </a:p>
+          <a:p>
+            <a:pPr lvl="1"/>
+            <a:r>
+              <a:rPr lang="en-US" dirty="0"/>
+              <a:t>You can rename your remote using </a:t>
+            </a:r>
+            <a:r>
+              <a:rPr lang="en-US" sz="1800" dirty="0">
+                <a:latin typeface="Consolas" panose="020B0609020204030204" pitchFamily="49" charset="0"/>
+              </a:rPr>
+              <a:t>git rename &lt;old&gt; &lt;new&gt;</a:t>
+            </a:r>
+            <a:r>
+              <a:rPr lang="en-US" dirty="0"/>
+              <a:t>. For example:</a:t>
+            </a:r>
+          </a:p>
+          <a:p>
+            <a:pPr marL="457200" lvl="1" indent="0">
+              <a:buNone/>
+            </a:pPr>
+            <a:r>
+              <a:rPr lang="en-US" dirty="0"/>
+              <a:t>	</a:t>
+            </a:r>
+            <a:r>
+              <a:rPr lang="en-US" sz="1800" dirty="0">
+                <a:latin typeface="Consolas" panose="020B0609020204030204" pitchFamily="49" charset="0"/>
+              </a:rPr>
+              <a:t>git rename origin </a:t>
+            </a:r>
+            <a:r>
+              <a:rPr lang="en-US" sz="1800" dirty="0" err="1">
+                <a:latin typeface="Consolas" panose="020B0609020204030204" pitchFamily="49" charset="0"/>
+              </a:rPr>
+              <a:t>ghrepo</a:t>
+            </a:r>
+            <a:endParaRPr lang="en-US" dirty="0">
+              <a:latin typeface="Consolas" panose="020B0609020204030204" pitchFamily="49" charset="0"/>
+            </a:endParaRPr>
           </a:p>
           <a:p>
             <a:r>

</xml_diff>